<commit_message>
Added timeline and some comments to the project file
Created v0.4 to the documentation and  Added timeline and some comments to the project file
</commit_message>
<xml_diff>
--- a/Project Documentation/Timeline - Ready for screenshot.pptx
+++ b/Project Documentation/Timeline - Ready for screenshot.pptx
@@ -104,6 +104,11 @@
       </a:defRPr>
     </a:lvl9pPr>
   </p:defaultTextStyle>
+  <p:extLst>
+    <p:ext uri="{EFAFB233-063F-42B5-8137-9DF3F51BA10A}">
+      <p15:sldGuideLst xmlns:p15="http://schemas.microsoft.com/office/powerpoint/2012/main"/>
+    </p:ext>
+  </p:extLst>
 </p:presentation>
 </file>
 
@@ -256,7 +261,7 @@
           <a:p>
             <a:fld id="{BBE5E238-F16B-4E90-BEB0-35EB9CF0A5A3}" type="datetimeFigureOut">
               <a:rPr lang="en-AU" smtClean="0"/>
-              <a:t>28/04/2018</a:t>
+              <a:t>29/04/2018</a:t>
             </a:fld>
             <a:endParaRPr lang="en-AU"/>
           </a:p>
@@ -456,7 +461,7 @@
           <a:p>
             <a:fld id="{BBE5E238-F16B-4E90-BEB0-35EB9CF0A5A3}" type="datetimeFigureOut">
               <a:rPr lang="en-AU" smtClean="0"/>
-              <a:t>28/04/2018</a:t>
+              <a:t>29/04/2018</a:t>
             </a:fld>
             <a:endParaRPr lang="en-AU"/>
           </a:p>
@@ -666,7 +671,7 @@
           <a:p>
             <a:fld id="{BBE5E238-F16B-4E90-BEB0-35EB9CF0A5A3}" type="datetimeFigureOut">
               <a:rPr lang="en-AU" smtClean="0"/>
-              <a:t>28/04/2018</a:t>
+              <a:t>29/04/2018</a:t>
             </a:fld>
             <a:endParaRPr lang="en-AU"/>
           </a:p>
@@ -866,7 +871,7 @@
           <a:p>
             <a:fld id="{BBE5E238-F16B-4E90-BEB0-35EB9CF0A5A3}" type="datetimeFigureOut">
               <a:rPr lang="en-AU" smtClean="0"/>
-              <a:t>28/04/2018</a:t>
+              <a:t>29/04/2018</a:t>
             </a:fld>
             <a:endParaRPr lang="en-AU"/>
           </a:p>
@@ -1142,7 +1147,7 @@
           <a:p>
             <a:fld id="{BBE5E238-F16B-4E90-BEB0-35EB9CF0A5A3}" type="datetimeFigureOut">
               <a:rPr lang="en-AU" smtClean="0"/>
-              <a:t>28/04/2018</a:t>
+              <a:t>29/04/2018</a:t>
             </a:fld>
             <a:endParaRPr lang="en-AU"/>
           </a:p>
@@ -1410,7 +1415,7 @@
           <a:p>
             <a:fld id="{BBE5E238-F16B-4E90-BEB0-35EB9CF0A5A3}" type="datetimeFigureOut">
               <a:rPr lang="en-AU" smtClean="0"/>
-              <a:t>28/04/2018</a:t>
+              <a:t>29/04/2018</a:t>
             </a:fld>
             <a:endParaRPr lang="en-AU"/>
           </a:p>
@@ -1825,7 +1830,7 @@
           <a:p>
             <a:fld id="{BBE5E238-F16B-4E90-BEB0-35EB9CF0A5A3}" type="datetimeFigureOut">
               <a:rPr lang="en-AU" smtClean="0"/>
-              <a:t>28/04/2018</a:t>
+              <a:t>29/04/2018</a:t>
             </a:fld>
             <a:endParaRPr lang="en-AU"/>
           </a:p>
@@ -1967,7 +1972,7 @@
           <a:p>
             <a:fld id="{BBE5E238-F16B-4E90-BEB0-35EB9CF0A5A3}" type="datetimeFigureOut">
               <a:rPr lang="en-AU" smtClean="0"/>
-              <a:t>28/04/2018</a:t>
+              <a:t>29/04/2018</a:t>
             </a:fld>
             <a:endParaRPr lang="en-AU"/>
           </a:p>
@@ -2080,7 +2085,7 @@
           <a:p>
             <a:fld id="{BBE5E238-F16B-4E90-BEB0-35EB9CF0A5A3}" type="datetimeFigureOut">
               <a:rPr lang="en-AU" smtClean="0"/>
-              <a:t>28/04/2018</a:t>
+              <a:t>29/04/2018</a:t>
             </a:fld>
             <a:endParaRPr lang="en-AU"/>
           </a:p>
@@ -2393,7 +2398,7 @@
           <a:p>
             <a:fld id="{BBE5E238-F16B-4E90-BEB0-35EB9CF0A5A3}" type="datetimeFigureOut">
               <a:rPr lang="en-AU" smtClean="0"/>
-              <a:t>28/04/2018</a:t>
+              <a:t>29/04/2018</a:t>
             </a:fld>
             <a:endParaRPr lang="en-AU"/>
           </a:p>
@@ -2682,7 +2687,7 @@
           <a:p>
             <a:fld id="{BBE5E238-F16B-4E90-BEB0-35EB9CF0A5A3}" type="datetimeFigureOut">
               <a:rPr lang="en-AU" smtClean="0"/>
-              <a:t>28/04/2018</a:t>
+              <a:t>29/04/2018</a:t>
             </a:fld>
             <a:endParaRPr lang="en-AU"/>
           </a:p>
@@ -2925,7 +2930,7 @@
           <a:p>
             <a:fld id="{BBE5E238-F16B-4E90-BEB0-35EB9CF0A5A3}" type="datetimeFigureOut">
               <a:rPr lang="en-AU" smtClean="0"/>
-              <a:t>28/04/2018</a:t>
+              <a:t>29/04/2018</a:t>
             </a:fld>
             <a:endParaRPr lang="en-AU"/>
           </a:p>
@@ -3552,10 +3557,10 @@
       </p:sp>
       <p:sp>
         <p:nvSpPr>
-          <p:cNvPr id="144" name="Freeform 76">
-            <a:extLst>
-              <a:ext uri="{FF2B5EF4-FFF2-40B4-BE49-F238E27FC236}">
-                <a16:creationId xmlns:a16="http://schemas.microsoft.com/office/drawing/2014/main" id="{CF3352AE-B6DA-4AEF-A9EF-087C463D3B02}"/>
+          <p:cNvPr id="76" name="Freeform 89">
+            <a:extLst>
+              <a:ext uri="{FF2B5EF4-FFF2-40B4-BE49-F238E27FC236}">
+                <a16:creationId xmlns:a16="http://schemas.microsoft.com/office/drawing/2014/main" id="{B6069F34-A8A9-45D4-818C-268C2D16F97D}"/>
               </a:ext>
             </a:extLst>
           </p:cNvPr>
@@ -3566,22 +3571,24 @@
         </p:nvSpPr>
         <p:spPr bwMode="auto">
           <a:xfrm>
-            <a:off x="2251442" y="3423392"/>
-            <a:ext cx="1149350" cy="336550"/>
+            <a:off x="2491549" y="2756641"/>
+            <a:ext cx="688060" cy="4101359"/>
           </a:xfrm>
           <a:custGeom>
             <a:avLst/>
             <a:gdLst>
-              <a:gd name="T0" fmla="*/ 2896 w 2896"/>
-              <a:gd name="T1" fmla="*/ 420 h 851"/>
-              <a:gd name="T2" fmla="*/ 1448 w 2896"/>
-              <a:gd name="T3" fmla="*/ 0 h 851"/>
-              <a:gd name="T4" fmla="*/ 0 w 2896"/>
-              <a:gd name="T5" fmla="*/ 420 h 851"/>
-              <a:gd name="T6" fmla="*/ 1448 w 2896"/>
-              <a:gd name="T7" fmla="*/ 851 h 851"/>
-              <a:gd name="T8" fmla="*/ 2896 w 2896"/>
-              <a:gd name="T9" fmla="*/ 420 h 851"/>
+              <a:gd name="T0" fmla="*/ 0 w 1748"/>
+              <a:gd name="T1" fmla="*/ 260 h 15225"/>
+              <a:gd name="T2" fmla="*/ 874 w 1748"/>
+              <a:gd name="T3" fmla="*/ 0 h 15225"/>
+              <a:gd name="T4" fmla="*/ 1748 w 1748"/>
+              <a:gd name="T5" fmla="*/ 260 h 15225"/>
+              <a:gd name="T6" fmla="*/ 1748 w 1748"/>
+              <a:gd name="T7" fmla="*/ 15225 h 15225"/>
+              <a:gd name="T8" fmla="*/ 0 w 1748"/>
+              <a:gd name="T9" fmla="*/ 15225 h 15225"/>
+              <a:gd name="T10" fmla="*/ 0 w 1748"/>
+              <a:gd name="T11" fmla="*/ 260 h 15225"/>
             </a:gdLst>
             <a:ahLst/>
             <a:cxnLst>
@@ -3600,31 +3607,37 @@
               <a:cxn ang="0">
                 <a:pos x="T8" y="T9"/>
               </a:cxn>
+              <a:cxn ang="0">
+                <a:pos x="T10" y="T11"/>
+              </a:cxn>
             </a:cxnLst>
             <a:rect l="0" t="0" r="r" b="b"/>
             <a:pathLst>
-              <a:path w="2896" h="851">
+              <a:path w="1748" h="15225">
                 <a:moveTo>
-                  <a:pt x="2896" y="420"/>
+                  <a:pt x="0" y="260"/>
                 </a:moveTo>
                 <a:lnTo>
-                  <a:pt x="1448" y="0"/>
-                </a:lnTo>
-                <a:lnTo>
-                  <a:pt x="0" y="420"/>
-                </a:lnTo>
-                <a:lnTo>
-                  <a:pt x="1448" y="851"/>
-                </a:lnTo>
-                <a:lnTo>
-                  <a:pt x="2896" y="420"/>
+                  <a:pt x="874" y="0"/>
+                </a:lnTo>
+                <a:lnTo>
+                  <a:pt x="1748" y="260"/>
+                </a:lnTo>
+                <a:lnTo>
+                  <a:pt x="1748" y="15225"/>
+                </a:lnTo>
+                <a:lnTo>
+                  <a:pt x="0" y="15225"/>
+                </a:lnTo>
+                <a:lnTo>
+                  <a:pt x="0" y="260"/>
                 </a:lnTo>
                 <a:close/>
               </a:path>
             </a:pathLst>
           </a:custGeom>
           <a:solidFill>
-            <a:srgbClr val="4F6A79"/>
+            <a:srgbClr val="D2DADC"/>
           </a:solidFill>
           <a:ln>
             <a:noFill/>
@@ -3650,111 +3663,7 @@
           </a:bodyPr>
           <a:lstStyle/>
           <a:p>
-            <a:endParaRPr lang="en-US" sz="1600"/>
-          </a:p>
-        </p:txBody>
-      </p:sp>
-      <p:sp>
-        <p:nvSpPr>
-          <p:cNvPr id="145" name="Freeform 77">
-            <a:extLst>
-              <a:ext uri="{FF2B5EF4-FFF2-40B4-BE49-F238E27FC236}">
-                <a16:creationId xmlns:a16="http://schemas.microsoft.com/office/drawing/2014/main" id="{0F40EE71-3784-494A-B938-DF4E09BD554E}"/>
-              </a:ext>
-            </a:extLst>
-          </p:cNvPr>
-          <p:cNvSpPr>
-            <a:spLocks/>
-          </p:cNvSpPr>
-          <p:nvPr/>
-        </p:nvSpPr>
-        <p:spPr bwMode="auto">
-          <a:xfrm>
-            <a:off x="2251442" y="4528292"/>
-            <a:ext cx="1149350" cy="338138"/>
-          </a:xfrm>
-          <a:custGeom>
-            <a:avLst/>
-            <a:gdLst>
-              <a:gd name="T0" fmla="*/ 2896 w 2896"/>
-              <a:gd name="T1" fmla="*/ 422 h 852"/>
-              <a:gd name="T2" fmla="*/ 1448 w 2896"/>
-              <a:gd name="T3" fmla="*/ 0 h 852"/>
-              <a:gd name="T4" fmla="*/ 0 w 2896"/>
-              <a:gd name="T5" fmla="*/ 422 h 852"/>
-              <a:gd name="T6" fmla="*/ 1448 w 2896"/>
-              <a:gd name="T7" fmla="*/ 852 h 852"/>
-              <a:gd name="T8" fmla="*/ 2896 w 2896"/>
-              <a:gd name="T9" fmla="*/ 422 h 852"/>
-            </a:gdLst>
-            <a:ahLst/>
-            <a:cxnLst>
-              <a:cxn ang="0">
-                <a:pos x="T0" y="T1"/>
-              </a:cxn>
-              <a:cxn ang="0">
-                <a:pos x="T2" y="T3"/>
-              </a:cxn>
-              <a:cxn ang="0">
-                <a:pos x="T4" y="T5"/>
-              </a:cxn>
-              <a:cxn ang="0">
-                <a:pos x="T6" y="T7"/>
-              </a:cxn>
-              <a:cxn ang="0">
-                <a:pos x="T8" y="T9"/>
-              </a:cxn>
-            </a:cxnLst>
-            <a:rect l="0" t="0" r="r" b="b"/>
-            <a:pathLst>
-              <a:path w="2896" h="852">
-                <a:moveTo>
-                  <a:pt x="2896" y="422"/>
-                </a:moveTo>
-                <a:lnTo>
-                  <a:pt x="1448" y="0"/>
-                </a:lnTo>
-                <a:lnTo>
-                  <a:pt x="0" y="422"/>
-                </a:lnTo>
-                <a:lnTo>
-                  <a:pt x="1448" y="852"/>
-                </a:lnTo>
-                <a:lnTo>
-                  <a:pt x="2896" y="422"/>
-                </a:lnTo>
-                <a:close/>
-              </a:path>
-            </a:pathLst>
-          </a:custGeom>
-          <a:solidFill>
-            <a:srgbClr val="F2583A"/>
-          </a:solidFill>
-          <a:ln>
-            <a:noFill/>
-          </a:ln>
-          <a:extLst>
-            <a:ext uri="{91240B29-F687-4F45-9708-019B960494DF}">
-              <a14:hiddenLine xmlns:a14="http://schemas.microsoft.com/office/drawing/2010/main" w="9525">
-                <a:solidFill>
-                  <a:srgbClr val="000000"/>
-                </a:solidFill>
-                <a:round/>
-                <a:headEnd/>
-                <a:tailEnd/>
-              </a14:hiddenLine>
-            </a:ext>
-          </a:extLst>
-        </p:spPr>
-        <p:txBody>
-          <a:bodyPr vert="horz" wrap="square" lIns="91440" tIns="45720" rIns="91440" bIns="45720" numCol="1" anchor="t" anchorCtr="0" compatLnSpc="1">
-            <a:prstTxWarp prst="textNoShape">
-              <a:avLst/>
-            </a:prstTxWarp>
-          </a:bodyPr>
-          <a:lstStyle/>
-          <a:p>
-            <a:endParaRPr lang="en-US" sz="1600"/>
+            <a:endParaRPr lang="en-US"/>
           </a:p>
         </p:txBody>
       </p:sp>
@@ -3878,8 +3787,8 @@
         </p:nvSpPr>
         <p:spPr bwMode="auto">
           <a:xfrm>
-            <a:off x="2480041" y="107104"/>
-            <a:ext cx="692150" cy="6042025"/>
+            <a:off x="2461777" y="-85773"/>
+            <a:ext cx="721922" cy="3369412"/>
           </a:xfrm>
           <a:custGeom>
             <a:avLst/>
@@ -3944,23 +3853,12 @@
             </a:pathLst>
           </a:custGeom>
           <a:solidFill>
-            <a:srgbClr val="D2DADC"/>
+            <a:srgbClr val="0070C0"/>
           </a:solidFill>
           <a:ln>
             <a:noFill/>
           </a:ln>
-          <a:extLst>
-            <a:ext uri="{91240B29-F687-4F45-9708-019B960494DF}">
-              <a14:hiddenLine xmlns:a14="http://schemas.microsoft.com/office/drawing/2010/main" w="9525">
-                <a:solidFill>
-                  <a:srgbClr val="000000"/>
-                </a:solidFill>
-                <a:round/>
-                <a:headEnd/>
-                <a:tailEnd/>
-              </a14:hiddenLine>
-            </a:ext>
-          </a:extLst>
+          <a:extLst/>
         </p:spPr>
         <p:txBody>
           <a:bodyPr vert="horz" wrap="square" lIns="91440" tIns="45720" rIns="91440" bIns="45720" numCol="1" anchor="t" anchorCtr="0" compatLnSpc="1">
@@ -4184,110 +4082,6 @@
       </p:sp>
       <p:sp>
         <p:nvSpPr>
-          <p:cNvPr id="150" name="Freeform 92">
-            <a:extLst>
-              <a:ext uri="{FF2B5EF4-FFF2-40B4-BE49-F238E27FC236}">
-                <a16:creationId xmlns:a16="http://schemas.microsoft.com/office/drawing/2014/main" id="{A171C763-E4A4-4FA7-96EE-219EF9C2760F}"/>
-              </a:ext>
-            </a:extLst>
-          </p:cNvPr>
-          <p:cNvSpPr>
-            <a:spLocks/>
-          </p:cNvSpPr>
-          <p:nvPr/>
-        </p:nvSpPr>
-        <p:spPr bwMode="auto">
-          <a:xfrm>
-            <a:off x="2480042" y="3320204"/>
-            <a:ext cx="346075" cy="439738"/>
-          </a:xfrm>
-          <a:custGeom>
-            <a:avLst/>
-            <a:gdLst>
-              <a:gd name="T0" fmla="*/ 874 w 874"/>
-              <a:gd name="T1" fmla="*/ 1111 h 1111"/>
-              <a:gd name="T2" fmla="*/ 0 w 874"/>
-              <a:gd name="T3" fmla="*/ 851 h 1111"/>
-              <a:gd name="T4" fmla="*/ 0 w 874"/>
-              <a:gd name="T5" fmla="*/ 0 h 1111"/>
-              <a:gd name="T6" fmla="*/ 874 w 874"/>
-              <a:gd name="T7" fmla="*/ 260 h 1111"/>
-              <a:gd name="T8" fmla="*/ 874 w 874"/>
-              <a:gd name="T9" fmla="*/ 1111 h 1111"/>
-            </a:gdLst>
-            <a:ahLst/>
-            <a:cxnLst>
-              <a:cxn ang="0">
-                <a:pos x="T0" y="T1"/>
-              </a:cxn>
-              <a:cxn ang="0">
-                <a:pos x="T2" y="T3"/>
-              </a:cxn>
-              <a:cxn ang="0">
-                <a:pos x="T4" y="T5"/>
-              </a:cxn>
-              <a:cxn ang="0">
-                <a:pos x="T6" y="T7"/>
-              </a:cxn>
-              <a:cxn ang="0">
-                <a:pos x="T8" y="T9"/>
-              </a:cxn>
-            </a:cxnLst>
-            <a:rect l="0" t="0" r="r" b="b"/>
-            <a:pathLst>
-              <a:path w="874" h="1111">
-                <a:moveTo>
-                  <a:pt x="874" y="1111"/>
-                </a:moveTo>
-                <a:lnTo>
-                  <a:pt x="0" y="851"/>
-                </a:lnTo>
-                <a:lnTo>
-                  <a:pt x="0" y="0"/>
-                </a:lnTo>
-                <a:lnTo>
-                  <a:pt x="874" y="260"/>
-                </a:lnTo>
-                <a:lnTo>
-                  <a:pt x="874" y="1111"/>
-                </a:lnTo>
-                <a:close/>
-              </a:path>
-            </a:pathLst>
-          </a:custGeom>
-          <a:solidFill>
-            <a:srgbClr val="DFE6E7"/>
-          </a:solidFill>
-          <a:ln>
-            <a:noFill/>
-          </a:ln>
-          <a:extLst>
-            <a:ext uri="{91240B29-F687-4F45-9708-019B960494DF}">
-              <a14:hiddenLine xmlns:a14="http://schemas.microsoft.com/office/drawing/2010/main" w="9525">
-                <a:solidFill>
-                  <a:srgbClr val="000000"/>
-                </a:solidFill>
-                <a:round/>
-                <a:headEnd/>
-                <a:tailEnd/>
-              </a14:hiddenLine>
-            </a:ext>
-          </a:extLst>
-        </p:spPr>
-        <p:txBody>
-          <a:bodyPr vert="horz" wrap="square" lIns="91440" tIns="45720" rIns="91440" bIns="45720" numCol="1" anchor="t" anchorCtr="0" compatLnSpc="1">
-            <a:prstTxWarp prst="textNoShape">
-              <a:avLst/>
-            </a:prstTxWarp>
-          </a:bodyPr>
-          <a:lstStyle/>
-          <a:p>
-            <a:endParaRPr lang="en-US" sz="1600"/>
-          </a:p>
-        </p:txBody>
-      </p:sp>
-      <p:sp>
-        <p:nvSpPr>
           <p:cNvPr id="151" name="Freeform 93">
             <a:extLst>
               <a:ext uri="{FF2B5EF4-FFF2-40B4-BE49-F238E27FC236}">
@@ -4360,23 +4154,12 @@
             </a:pathLst>
           </a:custGeom>
           <a:solidFill>
-            <a:srgbClr val="DFE6E7"/>
+            <a:srgbClr val="00B0F0"/>
           </a:solidFill>
           <a:ln>
             <a:noFill/>
           </a:ln>
-          <a:extLst>
-            <a:ext uri="{91240B29-F687-4F45-9708-019B960494DF}">
-              <a14:hiddenLine xmlns:a14="http://schemas.microsoft.com/office/drawing/2010/main" w="9525">
-                <a:solidFill>
-                  <a:srgbClr val="000000"/>
-                </a:solidFill>
-                <a:round/>
-                <a:headEnd/>
-                <a:tailEnd/>
-              </a14:hiddenLine>
-            </a:ext>
-          </a:extLst>
+          <a:extLst/>
         </p:spPr>
         <p:txBody>
           <a:bodyPr vert="horz" wrap="square" lIns="91440" tIns="45720" rIns="91440" bIns="45720" numCol="1" anchor="t" anchorCtr="0" compatLnSpc="1">
@@ -4464,23 +4247,12 @@
             </a:pathLst>
           </a:custGeom>
           <a:solidFill>
-            <a:srgbClr val="DFE6E7"/>
+            <a:srgbClr val="00B0F0"/>
           </a:solidFill>
           <a:ln>
             <a:noFill/>
           </a:ln>
-          <a:extLst>
-            <a:ext uri="{91240B29-F687-4F45-9708-019B960494DF}">
-              <a14:hiddenLine xmlns:a14="http://schemas.microsoft.com/office/drawing/2010/main" w="9525">
-                <a:solidFill>
-                  <a:srgbClr val="000000"/>
-                </a:solidFill>
-                <a:round/>
-                <a:headEnd/>
-                <a:tailEnd/>
-              </a14:hiddenLine>
-            </a:ext>
-          </a:extLst>
+          <a:extLst/>
         </p:spPr>
         <p:txBody>
           <a:bodyPr vert="horz" wrap="square" lIns="91440" tIns="45720" rIns="91440" bIns="45720" numCol="1" anchor="t" anchorCtr="0" compatLnSpc="1">
@@ -4834,7 +4606,7 @@
         </p:nvSpPr>
         <p:spPr bwMode="auto">
           <a:xfrm>
-            <a:off x="2219553" y="293759"/>
+            <a:off x="2238498" y="261212"/>
             <a:ext cx="574675" cy="938213"/>
           </a:xfrm>
           <a:custGeom>
@@ -7085,23 +6857,12 @@
             </a:pathLst>
           </a:custGeom>
           <a:solidFill>
-            <a:srgbClr val="DFE6E7"/>
+            <a:srgbClr val="00B0F0"/>
           </a:solidFill>
           <a:ln>
             <a:noFill/>
           </a:ln>
-          <a:extLst>
-            <a:ext uri="{91240B29-F687-4F45-9708-019B960494DF}">
-              <a14:hiddenLine xmlns:a14="http://schemas.microsoft.com/office/drawing/2010/main" w="9525">
-                <a:solidFill>
-                  <a:srgbClr val="000000"/>
-                </a:solidFill>
-                <a:round/>
-                <a:headEnd/>
-                <a:tailEnd/>
-              </a14:hiddenLine>
-            </a:ext>
-          </a:extLst>
+          <a:extLst/>
         </p:spPr>
         <p:txBody>
           <a:bodyPr vert="horz" wrap="square" lIns="91440" tIns="45720" rIns="91440" bIns="45720" numCol="1" anchor="t" anchorCtr="0" compatLnSpc="1">
@@ -7182,7 +6943,6 @@
             <a:bodyPr rtlCol="0" anchor="ctr"/>
             <a:lstStyle/>
             <a:p>
-              <a:pPr algn="ctr"/>
               <a:endParaRPr lang="en-US" sz="1100" dirty="0"/>
             </a:p>
           </p:txBody>
@@ -7274,7 +7034,6 @@
               </a:bodyPr>
               <a:lstStyle/>
               <a:p>
-                <a:pPr algn="just"/>
                 <a:r>
                   <a:rPr lang="en-AU" sz="1050" dirty="0">
                     <a:solidFill>
@@ -7364,7 +7123,6 @@
             <a:bodyPr rtlCol="0" anchor="ctr"/>
             <a:lstStyle/>
             <a:p>
-              <a:pPr algn="ctr"/>
               <a:endParaRPr lang="en-US" sz="1100" dirty="0"/>
             </a:p>
           </p:txBody>
@@ -7456,7 +7214,6 @@
               </a:bodyPr>
               <a:lstStyle/>
               <a:p>
-                <a:pPr algn="just"/>
                 <a:r>
                   <a:rPr lang="en-AU" sz="1050" dirty="0">
                     <a:solidFill>
@@ -7546,7 +7303,6 @@
             <a:bodyPr rtlCol="0" anchor="ctr"/>
             <a:lstStyle/>
             <a:p>
-              <a:pPr algn="ctr"/>
               <a:endParaRPr lang="en-US" sz="1100" dirty="0"/>
             </a:p>
           </p:txBody>
@@ -7638,7 +7394,6 @@
               </a:bodyPr>
               <a:lstStyle/>
               <a:p>
-                <a:pPr algn="just"/>
                 <a:r>
                   <a:rPr lang="en-AU" sz="1050" dirty="0">
                     <a:solidFill>
@@ -7675,10 +7430,10 @@
         </p:nvGrpSpPr>
         <p:grpSpPr>
           <a:xfrm>
-            <a:off x="4297290" y="3475630"/>
-            <a:ext cx="3414680" cy="1042593"/>
+            <a:off x="4297289" y="3475630"/>
+            <a:ext cx="3916211" cy="961801"/>
             <a:chOff x="2733378" y="1040171"/>
-            <a:chExt cx="3414680" cy="1042593"/>
+            <a:chExt cx="3414680" cy="961801"/>
           </a:xfrm>
         </p:grpSpPr>
         <p:sp>
@@ -7728,7 +7483,6 @@
             <a:bodyPr rtlCol="0" anchor="ctr"/>
             <a:lstStyle/>
             <a:p>
-              <a:pPr algn="ctr"/>
               <a:endParaRPr lang="en-US" sz="1100" dirty="0"/>
             </a:p>
           </p:txBody>
@@ -7748,9 +7502,9 @@
           <p:grpSpPr>
             <a:xfrm>
               <a:off x="2944654" y="1040171"/>
-              <a:ext cx="3203404" cy="1042593"/>
+              <a:ext cx="3203404" cy="961801"/>
               <a:chOff x="3880632" y="2418123"/>
-              <a:chExt cx="3203404" cy="1042593"/>
+              <a:chExt cx="3203404" cy="961801"/>
             </a:xfrm>
           </p:grpSpPr>
           <p:sp>
@@ -7806,8 +7560,8 @@
             </p:nvSpPr>
             <p:spPr>
               <a:xfrm>
-                <a:off x="3929356" y="2883635"/>
-                <a:ext cx="3154680" cy="577081"/>
+                <a:off x="3929356" y="2964426"/>
+                <a:ext cx="3154680" cy="415498"/>
               </a:xfrm>
               <a:prstGeom prst="rect">
                 <a:avLst/>
@@ -7820,7 +7574,6 @@
               </a:bodyPr>
               <a:lstStyle/>
               <a:p>
-                <a:pPr algn="just"/>
                 <a:r>
                   <a:rPr lang="en-AU" sz="1050" dirty="0">
                     <a:solidFill>
@@ -7829,7 +7582,7 @@
                       </a:schemeClr>
                     </a:solidFill>
                   </a:rPr>
-                  <a:t>Stakeholder workshop to review findings and recommendations. Gather feedback and comments for inclusion in </a:t>
+                  <a:t>Stakeholder workshop to review findings and recommendations. Gather feedback and comments for inclusion </a:t>
                 </a:r>
                 <a:endParaRPr lang="en-US" sz="1050" dirty="0">
                   <a:solidFill>
@@ -7910,7 +7663,6 @@
             <a:bodyPr rtlCol="0" anchor="ctr"/>
             <a:lstStyle/>
             <a:p>
-              <a:pPr algn="ctr"/>
               <a:endParaRPr lang="en-US" sz="1100" dirty="0"/>
             </a:p>
           </p:txBody>
@@ -8002,7 +7754,6 @@
               </a:bodyPr>
               <a:lstStyle/>
               <a:p>
-                <a:pPr algn="just"/>
                 <a:r>
                   <a:rPr lang="en-AU" sz="1050" dirty="0">
                     <a:solidFill>
@@ -8567,7 +8318,6 @@
             <a:bodyPr rtlCol="0" anchor="ctr"/>
             <a:lstStyle/>
             <a:p>
-              <a:pPr algn="ctr"/>
               <a:endParaRPr lang="en-US" sz="1100" dirty="0"/>
             </a:p>
           </p:txBody>
@@ -8659,7 +8409,6 @@
               </a:bodyPr>
               <a:lstStyle/>
               <a:p>
-                <a:pPr algn="just"/>
                 <a:r>
                   <a:rPr lang="en-AU" sz="1050" dirty="0">
                     <a:solidFill>
@@ -8739,6 +8488,214 @@
             <a:endParaRPr lang="en-US" sz="1600" dirty="0">
               <a:effectLst/>
             </a:endParaRPr>
+          </a:p>
+        </p:txBody>
+      </p:sp>
+      <p:sp>
+        <p:nvSpPr>
+          <p:cNvPr id="77" name="Freeform 90">
+            <a:extLst>
+              <a:ext uri="{FF2B5EF4-FFF2-40B4-BE49-F238E27FC236}">
+                <a16:creationId xmlns:a16="http://schemas.microsoft.com/office/drawing/2014/main" id="{3F6750D1-90CF-425E-9426-8D3CAB0D8B70}"/>
+              </a:ext>
+            </a:extLst>
+          </p:cNvPr>
+          <p:cNvSpPr>
+            <a:spLocks/>
+          </p:cNvSpPr>
+          <p:nvPr/>
+        </p:nvSpPr>
+        <p:spPr bwMode="auto">
+          <a:xfrm>
+            <a:off x="2467098" y="6615112"/>
+            <a:ext cx="346075" cy="409575"/>
+          </a:xfrm>
+          <a:custGeom>
+            <a:avLst/>
+            <a:gdLst>
+              <a:gd name="T0" fmla="*/ 874 w 874"/>
+              <a:gd name="T1" fmla="*/ 1031 h 1031"/>
+              <a:gd name="T2" fmla="*/ 0 w 874"/>
+              <a:gd name="T3" fmla="*/ 1031 h 1031"/>
+              <a:gd name="T4" fmla="*/ 0 w 874"/>
+              <a:gd name="T5" fmla="*/ 0 h 1031"/>
+              <a:gd name="T6" fmla="*/ 874 w 874"/>
+              <a:gd name="T7" fmla="*/ 259 h 1031"/>
+              <a:gd name="T8" fmla="*/ 874 w 874"/>
+              <a:gd name="T9" fmla="*/ 1031 h 1031"/>
+            </a:gdLst>
+            <a:ahLst/>
+            <a:cxnLst>
+              <a:cxn ang="0">
+                <a:pos x="T0" y="T1"/>
+              </a:cxn>
+              <a:cxn ang="0">
+                <a:pos x="T2" y="T3"/>
+              </a:cxn>
+              <a:cxn ang="0">
+                <a:pos x="T4" y="T5"/>
+              </a:cxn>
+              <a:cxn ang="0">
+                <a:pos x="T6" y="T7"/>
+              </a:cxn>
+              <a:cxn ang="0">
+                <a:pos x="T8" y="T9"/>
+              </a:cxn>
+            </a:cxnLst>
+            <a:rect l="0" t="0" r="r" b="b"/>
+            <a:pathLst>
+              <a:path w="874" h="1031">
+                <a:moveTo>
+                  <a:pt x="874" y="1031"/>
+                </a:moveTo>
+                <a:lnTo>
+                  <a:pt x="0" y="1031"/>
+                </a:lnTo>
+                <a:lnTo>
+                  <a:pt x="0" y="0"/>
+                </a:lnTo>
+                <a:lnTo>
+                  <a:pt x="874" y="259"/>
+                </a:lnTo>
+                <a:lnTo>
+                  <a:pt x="874" y="1031"/>
+                </a:lnTo>
+                <a:close/>
+              </a:path>
+            </a:pathLst>
+          </a:custGeom>
+          <a:solidFill>
+            <a:srgbClr val="DFE6E7"/>
+          </a:solidFill>
+          <a:ln>
+            <a:noFill/>
+          </a:ln>
+          <a:extLst>
+            <a:ext uri="{91240B29-F687-4F45-9708-019B960494DF}">
+              <a14:hiddenLine xmlns:a14="http://schemas.microsoft.com/office/drawing/2010/main" w="9525">
+                <a:solidFill>
+                  <a:srgbClr val="000000"/>
+                </a:solidFill>
+                <a:round/>
+                <a:headEnd/>
+                <a:tailEnd/>
+              </a14:hiddenLine>
+            </a:ext>
+          </a:extLst>
+        </p:spPr>
+        <p:txBody>
+          <a:bodyPr vert="horz" wrap="square" lIns="91440" tIns="45720" rIns="91440" bIns="45720" numCol="1" anchor="t" anchorCtr="0" compatLnSpc="1">
+            <a:prstTxWarp prst="textNoShape">
+              <a:avLst/>
+            </a:prstTxWarp>
+          </a:bodyPr>
+          <a:lstStyle/>
+          <a:p>
+            <a:endParaRPr lang="en-US"/>
+          </a:p>
+        </p:txBody>
+      </p:sp>
+      <p:sp>
+        <p:nvSpPr>
+          <p:cNvPr id="79" name="Freeform 91">
+            <a:extLst>
+              <a:ext uri="{FF2B5EF4-FFF2-40B4-BE49-F238E27FC236}">
+                <a16:creationId xmlns:a16="http://schemas.microsoft.com/office/drawing/2014/main" id="{1B6DEFAC-0769-4094-9B84-FF6652C9EFBD}"/>
+              </a:ext>
+            </a:extLst>
+          </p:cNvPr>
+          <p:cNvSpPr>
+            <a:spLocks/>
+          </p:cNvSpPr>
+          <p:nvPr/>
+        </p:nvSpPr>
+        <p:spPr bwMode="auto">
+          <a:xfrm>
+            <a:off x="2489504" y="3318844"/>
+            <a:ext cx="346075" cy="441325"/>
+          </a:xfrm>
+          <a:custGeom>
+            <a:avLst/>
+            <a:gdLst>
+              <a:gd name="T0" fmla="*/ 874 w 874"/>
+              <a:gd name="T1" fmla="*/ 1111 h 1111"/>
+              <a:gd name="T2" fmla="*/ 0 w 874"/>
+              <a:gd name="T3" fmla="*/ 850 h 1111"/>
+              <a:gd name="T4" fmla="*/ 0 w 874"/>
+              <a:gd name="T5" fmla="*/ 0 h 1111"/>
+              <a:gd name="T6" fmla="*/ 874 w 874"/>
+              <a:gd name="T7" fmla="*/ 259 h 1111"/>
+              <a:gd name="T8" fmla="*/ 874 w 874"/>
+              <a:gd name="T9" fmla="*/ 1111 h 1111"/>
+            </a:gdLst>
+            <a:ahLst/>
+            <a:cxnLst>
+              <a:cxn ang="0">
+                <a:pos x="T0" y="T1"/>
+              </a:cxn>
+              <a:cxn ang="0">
+                <a:pos x="T2" y="T3"/>
+              </a:cxn>
+              <a:cxn ang="0">
+                <a:pos x="T4" y="T5"/>
+              </a:cxn>
+              <a:cxn ang="0">
+                <a:pos x="T6" y="T7"/>
+              </a:cxn>
+              <a:cxn ang="0">
+                <a:pos x="T8" y="T9"/>
+              </a:cxn>
+            </a:cxnLst>
+            <a:rect l="0" t="0" r="r" b="b"/>
+            <a:pathLst>
+              <a:path w="874" h="1111">
+                <a:moveTo>
+                  <a:pt x="874" y="1111"/>
+                </a:moveTo>
+                <a:lnTo>
+                  <a:pt x="0" y="850"/>
+                </a:lnTo>
+                <a:lnTo>
+                  <a:pt x="0" y="0"/>
+                </a:lnTo>
+                <a:lnTo>
+                  <a:pt x="874" y="259"/>
+                </a:lnTo>
+                <a:lnTo>
+                  <a:pt x="874" y="1111"/>
+                </a:lnTo>
+                <a:close/>
+              </a:path>
+            </a:pathLst>
+          </a:custGeom>
+          <a:solidFill>
+            <a:srgbClr val="DFE6E7"/>
+          </a:solidFill>
+          <a:ln>
+            <a:noFill/>
+          </a:ln>
+          <a:extLst>
+            <a:ext uri="{91240B29-F687-4F45-9708-019B960494DF}">
+              <a14:hiddenLine xmlns:a14="http://schemas.microsoft.com/office/drawing/2010/main" w="9525">
+                <a:solidFill>
+                  <a:srgbClr val="000000"/>
+                </a:solidFill>
+                <a:round/>
+                <a:headEnd/>
+                <a:tailEnd/>
+              </a14:hiddenLine>
+            </a:ext>
+          </a:extLst>
+        </p:spPr>
+        <p:txBody>
+          <a:bodyPr vert="horz" wrap="square" lIns="91440" tIns="45720" rIns="91440" bIns="45720" numCol="1" anchor="t" anchorCtr="0" compatLnSpc="1">
+            <a:prstTxWarp prst="textNoShape">
+              <a:avLst/>
+            </a:prstTxWarp>
+          </a:bodyPr>
+          <a:lstStyle/>
+          <a:p>
+            <a:endParaRPr lang="en-US" sz="1600"/>
           </a:p>
         </p:txBody>
       </p:sp>

</xml_diff>

<commit_message>
added source link to how the timeline was created
</commit_message>
<xml_diff>
--- a/Project Documentation/Timeline - Ready for screenshot.pptx
+++ b/Project Documentation/Timeline - Ready for screenshot.pptx
@@ -6,6 +6,7 @@
   </p:sldMasterIdLst>
   <p:sldIdLst>
     <p:sldId id="256" r:id="rId2"/>
+    <p:sldId id="257" r:id="rId3"/>
   </p:sldIdLst>
   <p:sldSz cx="12192000" cy="6858000"/>
   <p:notesSz cx="6858000" cy="9144000"/>
@@ -8712,6 +8713,92 @@
 </p:sld>
 </file>
 
+<file path=ppt/slides/slide2.xml><?xml version="1.0" encoding="utf-8"?>
+<p:sld xmlns:a="http://schemas.openxmlformats.org/drawingml/2006/main" xmlns:r="http://schemas.openxmlformats.org/officeDocument/2006/relationships" xmlns:p="http://schemas.openxmlformats.org/presentationml/2006/main">
+  <p:cSld>
+    <p:spTree>
+      <p:nvGrpSpPr>
+        <p:cNvPr id="1" name=""/>
+        <p:cNvGrpSpPr/>
+        <p:nvPr/>
+      </p:nvGrpSpPr>
+      <p:grpSpPr>
+        <a:xfrm>
+          <a:off x="0" y="0"/>
+          <a:ext cx="0" cy="0"/>
+          <a:chOff x="0" y="0"/>
+          <a:chExt cx="0" cy="0"/>
+        </a:xfrm>
+      </p:grpSpPr>
+      <p:sp>
+        <p:nvSpPr>
+          <p:cNvPr id="2" name="Title 1">
+            <a:extLst>
+              <a:ext uri="{FF2B5EF4-FFF2-40B4-BE49-F238E27FC236}">
+                <a16:creationId xmlns:a16="http://schemas.microsoft.com/office/drawing/2014/main" id="{FCADDBE6-FADF-423A-9330-A4940A71A87D}"/>
+              </a:ext>
+            </a:extLst>
+          </p:cNvPr>
+          <p:cNvSpPr>
+            <a:spLocks noGrp="1"/>
+          </p:cNvSpPr>
+          <p:nvPr>
+            <p:ph type="title"/>
+          </p:nvPr>
+        </p:nvSpPr>
+        <p:spPr/>
+        <p:txBody>
+          <a:bodyPr/>
+          <a:lstStyle/>
+          <a:p>
+            <a:endParaRPr lang="en-AU" dirty="0"/>
+          </a:p>
+        </p:txBody>
+      </p:sp>
+      <p:sp>
+        <p:nvSpPr>
+          <p:cNvPr id="3" name="Content Placeholder 2">
+            <a:extLst>
+              <a:ext uri="{FF2B5EF4-FFF2-40B4-BE49-F238E27FC236}">
+                <a16:creationId xmlns:a16="http://schemas.microsoft.com/office/drawing/2014/main" id="{783DE09C-338F-4186-BCE3-00318818C78E}"/>
+              </a:ext>
+            </a:extLst>
+          </p:cNvPr>
+          <p:cNvSpPr>
+            <a:spLocks noGrp="1"/>
+          </p:cNvSpPr>
+          <p:nvPr>
+            <p:ph idx="1"/>
+          </p:nvPr>
+        </p:nvSpPr>
+        <p:spPr/>
+        <p:txBody>
+          <a:bodyPr/>
+          <a:lstStyle/>
+          <a:p>
+            <a:r>
+              <a:rPr lang="en-AU" dirty="0">
+                <a:hlinkClick r:id="rId2" tooltip="http://presentationgo.com/"/>
+              </a:rPr>
+              <a:t>Presentationgo.com</a:t>
+            </a:r>
+            <a:endParaRPr lang="en-AU" dirty="0"/>
+          </a:p>
+        </p:txBody>
+      </p:sp>
+    </p:spTree>
+    <p:extLst>
+      <p:ext uri="{BB962C8B-B14F-4D97-AF65-F5344CB8AC3E}">
+        <p14:creationId xmlns:p14="http://schemas.microsoft.com/office/powerpoint/2010/main" val="581432208"/>
+      </p:ext>
+    </p:extLst>
+  </p:cSld>
+  <p:clrMapOvr>
+    <a:masterClrMapping/>
+  </p:clrMapOvr>
+</p:sld>
+</file>
+
 <file path=ppt/theme/theme1.xml><?xml version="1.0" encoding="utf-8"?>
 <a:theme xmlns:a="http://schemas.openxmlformats.org/drawingml/2006/main" name="Office Theme">
   <a:themeElements>

</xml_diff>